<commit_message>
Small Changes: Pre Publication
</commit_message>
<xml_diff>
--- a/help/m2doc_Workflow_V100_21-06-17.pptx
+++ b/help/m2doc_Workflow_V100_21-06-17.pptx
@@ -292,7 +292,7 @@
               <a:pPr>
                 <a:defRPr/>
               </a:pPr>
-              <a:t>7/1/2021</a:t>
+              <a:t>7/7/2021</a:t>
             </a:fld>
             <a:endParaRPr lang="en-US"/>
           </a:p>
@@ -515,7 +515,7 @@
               <a:pPr>
                 <a:defRPr/>
               </a:pPr>
-              <a:t>7/1/2021</a:t>
+              <a:t>7/7/2021</a:t>
             </a:fld>
             <a:endParaRPr lang="en-US"/>
           </a:p>
@@ -1992,109 +1992,55 @@
               <a:rPr lang="de-DE" altLang="de-DE" sz="700" b="1" noProof="0" dirty="0">
                 <a:latin typeface="Verdana" panose="020B0604030504040204" pitchFamily="34" charset="0"/>
               </a:rPr>
-              <a:t>. , FH AACHEN</a:t>
-            </a:r>
-            <a:r>
-              <a:rPr lang="de-DE" altLang="de-DE" sz="700" b="1" baseline="0" noProof="0" dirty="0">
+              <a:t>. </a:t>
+            </a:r>
+            <a:r>
+              <a:rPr lang="de-DE" altLang="de-DE" sz="700" b="1" noProof="0" dirty="0" smtClean="0">
+                <a:latin typeface="Verdana" panose="020B0604030504040204" pitchFamily="34" charset="0"/>
+              </a:rPr>
+              <a:t>, Pierre Ollfisch </a:t>
+            </a:r>
+            <a:r>
+              <a:rPr lang="de-DE" altLang="de-DE" sz="700" b="1" noProof="0" dirty="0" err="1" smtClean="0">
+                <a:latin typeface="Verdana" panose="020B0604030504040204" pitchFamily="34" charset="0"/>
+              </a:rPr>
+              <a:t>M.Sc</a:t>
+            </a:r>
+            <a:r>
+              <a:rPr lang="de-DE" altLang="de-DE" sz="700" b="1" noProof="0" dirty="0" smtClean="0">
+                <a:latin typeface="Verdana" panose="020B0604030504040204" pitchFamily="34" charset="0"/>
+              </a:rPr>
+              <a:t>.</a:t>
+            </a:r>
+            <a:r>
+              <a:rPr lang="de-DE" altLang="de-DE" sz="700" b="1" baseline="0" noProof="0" dirty="0" smtClean="0">
                 <a:latin typeface="Verdana" panose="020B0604030504040204" pitchFamily="34" charset="0"/>
               </a:rPr>
               <a:t> </a:t>
             </a:r>
             <a:r>
-              <a:rPr lang="de-DE" altLang="de-DE" sz="700" b="0" noProof="0" dirty="0">
+              <a:rPr lang="de-DE" altLang="de-DE" sz="700" b="1" noProof="0" dirty="0" smtClean="0">
                 <a:latin typeface="Verdana" panose="020B0604030504040204" pitchFamily="34" charset="0"/>
               </a:rPr>
-              <a:t>|</a:t>
+              <a:t>, </a:t>
             </a:r>
             <a:r>
               <a:rPr lang="de-DE" altLang="de-DE" sz="700" b="1" noProof="0" dirty="0">
                 <a:latin typeface="Verdana" panose="020B0604030504040204" pitchFamily="34" charset="0"/>
               </a:rPr>
-              <a:t>  </a:t>
-            </a:r>
-            <a:r>
-              <a:rPr lang="de-DE" altLang="de-DE" sz="700" b="0" noProof="0" dirty="0">
+              <a:t>FH </a:t>
+            </a:r>
+            <a:r>
+              <a:rPr lang="de-DE" altLang="de-DE" sz="700" b="1" noProof="0" dirty="0" smtClean="0">
                 <a:latin typeface="Verdana" panose="020B0604030504040204" pitchFamily="34" charset="0"/>
               </a:rPr>
-              <a:t>Aerospace Engineering |</a:t>
-            </a:r>
-            <a:r>
-              <a:rPr lang="de-DE" altLang="de-DE" sz="700" b="0" baseline="0" noProof="0" dirty="0">
+              <a:t>AACHEN	</a:t>
+            </a:r>
+            <a:r>
+              <a:rPr lang="de-DE" altLang="de-DE" sz="700" noProof="0" dirty="0" smtClean="0">
                 <a:latin typeface="Verdana" panose="020B0604030504040204" pitchFamily="34" charset="0"/>
               </a:rPr>
-              <a:t> </a:t>
-            </a:r>
-            <a:r>
-              <a:rPr lang="de-DE" altLang="de-DE" sz="700" b="0" baseline="0" noProof="0" dirty="0" err="1">
-                <a:latin typeface="Verdana" panose="020B0604030504040204" pitchFamily="34" charset="0"/>
-              </a:rPr>
-              <a:t>Copies</a:t>
-            </a:r>
-            <a:r>
-              <a:rPr lang="de-DE" altLang="de-DE" sz="700" b="0" baseline="0" noProof="0" dirty="0">
-                <a:latin typeface="Verdana" panose="020B0604030504040204" pitchFamily="34" charset="0"/>
-              </a:rPr>
-              <a:t> (digital </a:t>
-            </a:r>
-            <a:r>
-              <a:rPr lang="de-DE" altLang="de-DE" sz="700" b="0" baseline="0" noProof="0" dirty="0" err="1">
-                <a:latin typeface="Verdana" panose="020B0604030504040204" pitchFamily="34" charset="0"/>
-              </a:rPr>
-              <a:t>or</a:t>
-            </a:r>
-            <a:r>
-              <a:rPr lang="de-DE" altLang="de-DE" sz="700" b="0" baseline="0" noProof="0" dirty="0">
-                <a:latin typeface="Verdana" panose="020B0604030504040204" pitchFamily="34" charset="0"/>
-              </a:rPr>
-              <a:t> </a:t>
-            </a:r>
-            <a:r>
-              <a:rPr lang="de-DE" altLang="de-DE" sz="700" b="0" baseline="0" noProof="0" dirty="0" err="1">
-                <a:latin typeface="Verdana" panose="020B0604030504040204" pitchFamily="34" charset="0"/>
-              </a:rPr>
-              <a:t>photographic</a:t>
-            </a:r>
-            <a:r>
-              <a:rPr lang="de-DE" altLang="de-DE" sz="700" b="0" baseline="0" noProof="0" dirty="0">
-                <a:latin typeface="Verdana" panose="020B0604030504040204" pitchFamily="34" charset="0"/>
-              </a:rPr>
-              <a:t>) </a:t>
-            </a:r>
-            <a:r>
-              <a:rPr lang="de-DE" altLang="de-DE" sz="700" b="0" baseline="0" noProof="0" dirty="0" err="1">
-                <a:latin typeface="Verdana" panose="020B0604030504040204" pitchFamily="34" charset="0"/>
-              </a:rPr>
-              <a:t>are</a:t>
-            </a:r>
-            <a:r>
-              <a:rPr lang="de-DE" altLang="de-DE" sz="700" b="0" baseline="0" noProof="0" dirty="0">
-                <a:latin typeface="Verdana" panose="020B0604030504040204" pitchFamily="34" charset="0"/>
-              </a:rPr>
-              <a:t> </a:t>
-            </a:r>
-            <a:r>
-              <a:rPr lang="de-DE" altLang="de-DE" sz="700" b="0" baseline="0" noProof="0" dirty="0" err="1">
-                <a:latin typeface="Verdana" panose="020B0604030504040204" pitchFamily="34" charset="0"/>
-              </a:rPr>
-              <a:t>strictly</a:t>
-            </a:r>
-            <a:r>
-              <a:rPr lang="de-DE" altLang="de-DE" sz="700" b="0" baseline="0" noProof="0" dirty="0">
-                <a:latin typeface="Verdana" panose="020B0604030504040204" pitchFamily="34" charset="0"/>
-              </a:rPr>
-              <a:t> </a:t>
-            </a:r>
-            <a:r>
-              <a:rPr lang="de-DE" altLang="de-DE" sz="700" b="0" baseline="0" noProof="0" dirty="0" err="1">
-                <a:latin typeface="Verdana" panose="020B0604030504040204" pitchFamily="34" charset="0"/>
-              </a:rPr>
-              <a:t>prohibited</a:t>
-            </a:r>
-            <a:r>
-              <a:rPr lang="de-DE" altLang="de-DE" sz="700" noProof="0" dirty="0">
-                <a:latin typeface="Verdana" panose="020B0604030504040204" pitchFamily="34" charset="0"/>
-              </a:rPr>
-              <a:t>! | </a:t>
+              <a:t>| </a:t>
             </a:r>
             <a:fld id="{23491213-9361-47DC-A233-727F10E7DD79}" type="slidenum">
               <a:rPr lang="de-DE" altLang="de-DE" sz="700" noProof="0" smtClean="0"/>
@@ -2502,7 +2448,7 @@
       </a:lvl9pPr>
     </p:otherStyle>
   </p:txStyles>
-  <p:extLst>
+  <p:extLst mod="1">
     <p:ext uri="{27BBF7A9-308A-43DC-89C8-2F10F3537804}">
       <p15:sldGuideLst xmlns:p15="http://schemas.microsoft.com/office/powerpoint/2012/main"/>
     </p:ext>
@@ -8611,12 +8557,16 @@
               <a:t>Workflow </a:t>
             </a:r>
             <a:r>
-              <a:rPr lang="de-DE" dirty="0" err="1"/>
-              <a:t>lvl</a:t>
+              <a:rPr lang="de-DE" dirty="0" smtClean="0"/>
+              <a:t>Leve</a:t>
+            </a:r>
+            <a:r>
+              <a:rPr lang="de-DE" dirty="0" smtClean="0"/>
+              <a:t>l </a:t>
             </a:r>
             <a:r>
               <a:rPr lang="de-DE" dirty="0"/>
-              <a:t> 3: </a:t>
+              <a:t>3: </a:t>
             </a:r>
             <a:r>
               <a:rPr lang="de-DE" dirty="0" err="1"/>

</xml_diff>